<commit_message>
sua duoi file example1
</commit_message>
<xml_diff>
--- a/Bài 2/LATEX_CO_BAN_BAI_2.pptx
+++ b/Bài 2/LATEX_CO_BAN_BAI_2.pptx
@@ -14,6 +14,7 @@
     <p:sldId id="262" r:id="rId8"/>
     <p:sldId id="263" r:id="rId9"/>
     <p:sldId id="264" r:id="rId10"/>
+    <p:sldId id="265" r:id="rId11"/>
   </p:sldIdLst>
   <p:sldSz cx="12192000" cy="6858000"/>
   <p:notesSz cx="6858000" cy="9144000"/>
@@ -112,6 +113,11 @@
       </a:defRPr>
     </a:lvl9pPr>
   </p:defaultTextStyle>
+  <p:extLst>
+    <p:ext uri="{EFAFB233-063F-42B5-8137-9DF3F51BA10A}">
+      <p15:sldGuideLst xmlns:p15="http://schemas.microsoft.com/office/powerpoint/2012/main"/>
+    </p:ext>
+  </p:extLst>
 </p:presentation>
 </file>
 
@@ -5960,6 +5966,74 @@
 </p:sld>
 </file>
 
+<file path=ppt/slides/slide10.xml><?xml version="1.0" encoding="utf-8"?>
+<p:sld xmlns:a="http://schemas.openxmlformats.org/drawingml/2006/main" xmlns:r="http://schemas.openxmlformats.org/officeDocument/2006/relationships" xmlns:p="http://schemas.openxmlformats.org/presentationml/2006/main">
+  <p:cSld>
+    <p:spTree>
+      <p:nvGrpSpPr>
+        <p:cNvPr id="1" name=""/>
+        <p:cNvGrpSpPr/>
+        <p:nvPr/>
+      </p:nvGrpSpPr>
+      <p:grpSpPr>
+        <a:xfrm>
+          <a:off x="0" y="0"/>
+          <a:ext cx="0" cy="0"/>
+          <a:chOff x="0" y="0"/>
+          <a:chExt cx="0" cy="0"/>
+        </a:xfrm>
+      </p:grpSpPr>
+      <p:sp>
+        <p:nvSpPr>
+          <p:cNvPr id="2" name="Title 1"/>
+          <p:cNvSpPr>
+            <a:spLocks noGrp="1"/>
+          </p:cNvSpPr>
+          <p:nvPr>
+            <p:ph type="title"/>
+          </p:nvPr>
+        </p:nvSpPr>
+        <p:spPr/>
+        <p:txBody>
+          <a:bodyPr/>
+          <a:lstStyle/>
+          <a:p>
+            <a:endParaRPr lang="vi-VN"/>
+          </a:p>
+        </p:txBody>
+      </p:sp>
+      <p:sp>
+        <p:nvSpPr>
+          <p:cNvPr id="3" name="Content Placeholder 2"/>
+          <p:cNvSpPr>
+            <a:spLocks noGrp="1"/>
+          </p:cNvSpPr>
+          <p:nvPr>
+            <p:ph idx="1"/>
+          </p:nvPr>
+        </p:nvSpPr>
+        <p:spPr/>
+        <p:txBody>
+          <a:bodyPr/>
+          <a:lstStyle/>
+          <a:p>
+            <a:endParaRPr lang="vi-VN"/>
+          </a:p>
+        </p:txBody>
+      </p:sp>
+    </p:spTree>
+    <p:extLst>
+      <p:ext uri="{BB962C8B-B14F-4D97-AF65-F5344CB8AC3E}">
+        <p14:creationId xmlns:p14="http://schemas.microsoft.com/office/powerpoint/2010/main" val="1549622419"/>
+      </p:ext>
+    </p:extLst>
+  </p:cSld>
+  <p:clrMapOvr>
+    <a:masterClrMapping/>
+  </p:clrMapOvr>
+</p:sld>
+</file>
+
 <file path=ppt/slides/slide2.xml><?xml version="1.0" encoding="utf-8"?>
 <p:sld xmlns:a="http://schemas.openxmlformats.org/drawingml/2006/main" xmlns:r="http://schemas.openxmlformats.org/officeDocument/2006/relationships" xmlns:p="http://schemas.openxmlformats.org/presentationml/2006/main">
   <p:cSld>
@@ -7078,6 +7152,63 @@
           <a:xfrm>
             <a:off x="552103" y="3982238"/>
             <a:ext cx="4650385" cy="1619331"/>
+          </a:xfrm>
+          <a:prstGeom prst="rect">
+            <a:avLst/>
+          </a:prstGeom>
+        </p:spPr>
+      </p:pic>
+      <p:sp>
+        <p:nvSpPr>
+          <p:cNvPr id="7" name="TextBox 6"/>
+          <p:cNvSpPr txBox="1"/>
+          <p:nvPr/>
+        </p:nvSpPr>
+        <p:spPr>
+          <a:xfrm>
+            <a:off x="5202488" y="1562273"/>
+            <a:ext cx="4746812" cy="446276"/>
+          </a:xfrm>
+          <a:prstGeom prst="rect">
+            <a:avLst/>
+          </a:prstGeom>
+          <a:noFill/>
+        </p:spPr>
+        <p:txBody>
+          <a:bodyPr wrap="none" rtlCol="0">
+            <a:spAutoFit/>
+          </a:bodyPr>
+          <a:lstStyle/>
+          <a:p>
+            <a:r>
+              <a:rPr lang="vi-VN" sz="2300" dirty="0" smtClean="0"/>
+              <a:t>\underline </a:t>
+            </a:r>
+            <a:r>
+              <a:rPr lang="vi-VN" sz="2300" dirty="0"/>
+              <a:t>{Đây là dòng gạch dưới}</a:t>
+            </a:r>
+          </a:p>
+        </p:txBody>
+      </p:sp>
+      <p:pic>
+        <p:nvPicPr>
+          <p:cNvPr id="8" name="Picture 7"/>
+          <p:cNvPicPr>
+            <a:picLocks noChangeAspect="1"/>
+          </p:cNvPicPr>
+          <p:nvPr/>
+        </p:nvPicPr>
+        <p:blipFill>
+          <a:blip r:embed="rId4"/>
+          <a:stretch>
+            <a:fillRect/>
+          </a:stretch>
+        </p:blipFill>
+        <p:spPr>
+          <a:xfrm>
+            <a:off x="5449189" y="2147622"/>
+            <a:ext cx="4253410" cy="1198555"/>
           </a:xfrm>
           <a:prstGeom prst="rect">
             <a:avLst/>

</xml_diff>